<commit_message>
Added three resources for this week (so far)
</commit_message>
<xml_diff>
--- a/Sasha Research Sources.pptx
+++ b/Sasha Research Sources.pptx
@@ -6,6 +6,11 @@
   </p:sldMasterIdLst>
   <p:sldIdLst>
     <p:sldId id="256" r:id="rId2"/>
+    <p:sldId id="258" r:id="rId3"/>
+    <p:sldId id="257" r:id="rId4"/>
+    <p:sldId id="259" r:id="rId5"/>
+    <p:sldId id="260" r:id="rId6"/>
+    <p:sldId id="261" r:id="rId7"/>
   </p:sldIdLst>
   <p:sldSz cx="12192000" cy="6858000"/>
   <p:notesSz cx="6858000" cy="9144000"/>
@@ -104,6 +109,11 @@
       </a:defRPr>
     </a:lvl9pPr>
   </p:defaultTextStyle>
+  <p:extLst>
+    <p:ext uri="{EFAFB233-063F-42B5-8137-9DF3F51BA10A}">
+      <p15:sldGuideLst xmlns:p15="http://schemas.microsoft.com/office/powerpoint/2012/main"/>
+    </p:ext>
+  </p:extLst>
 </p:presentation>
 </file>
 
@@ -3614,8 +3624,8 @@
         </p:nvSpPr>
         <p:spPr>
           <a:xfrm>
-            <a:off x="1066800" y="642594"/>
-            <a:ext cx="10058400" cy="1371600"/>
+            <a:off x="559724" y="642594"/>
+            <a:ext cx="10565476" cy="1371600"/>
           </a:xfrm>
           <a:prstGeom prst="rect">
             <a:avLst/>
@@ -3628,10 +3638,9 @@
           <a:lstStyle/>
           <a:p>
             <a:r>
-              <a:rPr lang="en-US"/>
-              <a:t>Click to edit Master title style</a:t>
-            </a:r>
-            <a:endParaRPr lang="en-US" dirty="0"/>
+              <a:rPr lang="en-US" dirty="0"/>
+              <a:t>Title</a:t>
+            </a:r>
           </a:p>
         </p:txBody>
       </p:sp>
@@ -3647,8 +3656,8 @@
         </p:nvSpPr>
         <p:spPr>
           <a:xfrm>
-            <a:off x="1066800" y="2103120"/>
-            <a:ext cx="10058400" cy="3931920"/>
+            <a:off x="559724" y="2103120"/>
+            <a:ext cx="10565476" cy="3931920"/>
           </a:xfrm>
           <a:prstGeom prst="rect">
             <a:avLst/>
@@ -3662,38 +3671,23 @@
           <a:p>
             <a:pPr lvl="0"/>
             <a:r>
-              <a:rPr lang="en-US"/>
-              <a:t>Click to edit Master text styles</a:t>
-            </a:r>
-          </a:p>
-          <a:p>
-            <a:pPr lvl="1"/>
-            <a:r>
-              <a:rPr lang="en-US"/>
-              <a:t>Second level</a:t>
-            </a:r>
-          </a:p>
-          <a:p>
-            <a:pPr lvl="2"/>
-            <a:r>
-              <a:rPr lang="en-US"/>
-              <a:t>Third level</a:t>
-            </a:r>
-          </a:p>
-          <a:p>
-            <a:pPr lvl="3"/>
-            <a:r>
-              <a:rPr lang="en-US"/>
-              <a:t>Fourth level</a:t>
-            </a:r>
-          </a:p>
-          <a:p>
-            <a:pPr lvl="4"/>
-            <a:r>
-              <a:rPr lang="en-US"/>
-              <a:t>Fifth level</a:t>
-            </a:r>
-            <a:endParaRPr lang="en-US" dirty="0"/>
+              <a:rPr lang="en-US" dirty="0"/>
+              <a:t>Blurb</a:t>
+            </a:r>
+          </a:p>
+          <a:p>
+            <a:pPr lvl="0"/>
+            <a:r>
+              <a:rPr lang="en-US" dirty="0"/>
+              <a:t>Relevance to work</a:t>
+            </a:r>
+          </a:p>
+          <a:p>
+            <a:pPr lvl="0"/>
+            <a:r>
+              <a:rPr lang="en-US" dirty="0"/>
+              <a:t>Tags</a:t>
+            </a:r>
           </a:p>
         </p:txBody>
       </p:sp>
@@ -4270,6 +4264,634 @@
 </p:sld>
 </file>
 
+<file path=ppt/slides/slide2.xml><?xml version="1.0" encoding="utf-8"?>
+<p:sld xmlns:a="http://schemas.openxmlformats.org/drawingml/2006/main" xmlns:r="http://schemas.openxmlformats.org/officeDocument/2006/relationships" xmlns:p="http://schemas.openxmlformats.org/presentationml/2006/main">
+  <p:cSld>
+    <p:spTree>
+      <p:nvGrpSpPr>
+        <p:cNvPr id="1" name=""/>
+        <p:cNvGrpSpPr/>
+        <p:nvPr/>
+      </p:nvGrpSpPr>
+      <p:grpSpPr>
+        <a:xfrm>
+          <a:off x="0" y="0"/>
+          <a:ext cx="0" cy="0"/>
+          <a:chOff x="0" y="0"/>
+          <a:chExt cx="0" cy="0"/>
+        </a:xfrm>
+      </p:grpSpPr>
+      <p:sp>
+        <p:nvSpPr>
+          <p:cNvPr id="2" name="Title 1">
+            <a:extLst>
+              <a:ext uri="{FF2B5EF4-FFF2-40B4-BE49-F238E27FC236}">
+                <a16:creationId xmlns:a16="http://schemas.microsoft.com/office/drawing/2014/main" id="{326CDCB0-2879-05E1-692A-5ED08DFB1ADD}"/>
+              </a:ext>
+            </a:extLst>
+          </p:cNvPr>
+          <p:cNvSpPr>
+            <a:spLocks noGrp="1"/>
+          </p:cNvSpPr>
+          <p:nvPr>
+            <p:ph type="title"/>
+          </p:nvPr>
+        </p:nvSpPr>
+        <p:spPr>
+          <a:xfrm>
+            <a:off x="1560576" y="2135124"/>
+            <a:ext cx="9070848" cy="2587752"/>
+          </a:xfrm>
+        </p:spPr>
+        <p:txBody>
+          <a:bodyPr/>
+          <a:lstStyle/>
+          <a:p>
+            <a:r>
+              <a:rPr lang="en-US" sz="5400" dirty="0"/>
+              <a:t>Week of 6/12/23</a:t>
+            </a:r>
+          </a:p>
+        </p:txBody>
+      </p:sp>
+    </p:spTree>
+    <p:extLst>
+      <p:ext uri="{BB962C8B-B14F-4D97-AF65-F5344CB8AC3E}">
+        <p14:creationId xmlns:p14="http://schemas.microsoft.com/office/powerpoint/2010/main" val="2618925382"/>
+      </p:ext>
+    </p:extLst>
+  </p:cSld>
+  <p:clrMapOvr>
+    <a:masterClrMapping/>
+  </p:clrMapOvr>
+</p:sld>
+</file>
+
+<file path=ppt/slides/slide3.xml><?xml version="1.0" encoding="utf-8"?>
+<p:sld xmlns:a="http://schemas.openxmlformats.org/drawingml/2006/main" xmlns:r="http://schemas.openxmlformats.org/officeDocument/2006/relationships" xmlns:p="http://schemas.openxmlformats.org/presentationml/2006/main">
+  <p:cSld>
+    <p:spTree>
+      <p:nvGrpSpPr>
+        <p:cNvPr id="1" name=""/>
+        <p:cNvGrpSpPr/>
+        <p:nvPr/>
+      </p:nvGrpSpPr>
+      <p:grpSpPr>
+        <a:xfrm>
+          <a:off x="0" y="0"/>
+          <a:ext cx="0" cy="0"/>
+          <a:chOff x="0" y="0"/>
+          <a:chExt cx="0" cy="0"/>
+        </a:xfrm>
+      </p:grpSpPr>
+      <p:sp>
+        <p:nvSpPr>
+          <p:cNvPr id="2" name="Title 1">
+            <a:extLst>
+              <a:ext uri="{FF2B5EF4-FFF2-40B4-BE49-F238E27FC236}">
+                <a16:creationId xmlns:a16="http://schemas.microsoft.com/office/drawing/2014/main" id="{1836669E-7D47-3C8B-CBD9-BEC0259BB146}"/>
+              </a:ext>
+            </a:extLst>
+          </p:cNvPr>
+          <p:cNvSpPr>
+            <a:spLocks noGrp="1"/>
+          </p:cNvSpPr>
+          <p:nvPr>
+            <p:ph type="title"/>
+          </p:nvPr>
+        </p:nvSpPr>
+        <p:spPr>
+          <a:xfrm>
+            <a:off x="543098" y="642594"/>
+            <a:ext cx="10582102" cy="1371600"/>
+          </a:xfrm>
+        </p:spPr>
+        <p:txBody>
+          <a:bodyPr>
+            <a:normAutofit fontScale="90000"/>
+          </a:bodyPr>
+          <a:lstStyle/>
+          <a:p>
+            <a:r>
+              <a:rPr lang="en-US" dirty="0"/>
+              <a:t>The YouTube Algorithm and the Alt-Right Filter Bubble</a:t>
+            </a:r>
+          </a:p>
+        </p:txBody>
+      </p:sp>
+      <p:sp>
+        <p:nvSpPr>
+          <p:cNvPr id="3" name="Content Placeholder 2">
+            <a:extLst>
+              <a:ext uri="{FF2B5EF4-FFF2-40B4-BE49-F238E27FC236}">
+                <a16:creationId xmlns:a16="http://schemas.microsoft.com/office/drawing/2014/main" id="{1D48D484-6200-34E3-E5F0-1D76EB681F62}"/>
+              </a:ext>
+            </a:extLst>
+          </p:cNvPr>
+          <p:cNvSpPr>
+            <a:spLocks noGrp="1"/>
+          </p:cNvSpPr>
+          <p:nvPr>
+            <p:ph idx="1"/>
+          </p:nvPr>
+        </p:nvSpPr>
+        <p:spPr>
+          <a:xfrm>
+            <a:off x="543098" y="2014194"/>
+            <a:ext cx="6471567" cy="4453108"/>
+          </a:xfrm>
+        </p:spPr>
+        <p:txBody>
+          <a:bodyPr>
+            <a:normAutofit/>
+          </a:bodyPr>
+          <a:lstStyle/>
+          <a:p>
+            <a:pPr marL="0" indent="0">
+              <a:buNone/>
+            </a:pPr>
+            <a:r>
+              <a:rPr lang="en-US" sz="1100" dirty="0"/>
+              <a:t>Lauren Valentino Bryant</a:t>
+            </a:r>
+            <a:endParaRPr lang="en-US" sz="1100" b="1" i="1" dirty="0"/>
+          </a:p>
+          <a:p>
+            <a:r>
+              <a:rPr lang="en-US" sz="1400" b="1" i="1" dirty="0"/>
+              <a:t>Summary blurb:</a:t>
+            </a:r>
+            <a:r>
+              <a:rPr lang="en-US" sz="1400" dirty="0"/>
+              <a:t> The YouTube algorithm measures relationships between videos and suggested videos, and tracks whether or not users clicked from one to the other. This tracking data feeds a neural network system whose aim is to suggest content that keeps users as engaged as possible. More time watching videos == more opportunities for advertisements. However, more “tightly bound” relationships were found between right-wing extremists videos (meaning it’s easier to get to increasingly polarizing right-wing content) than left-wing videos. This creates a “filter bubble” in which search algorithms only surround users with their own viewpoints, leading to an absence of diversity of thought.</a:t>
+            </a:r>
+          </a:p>
+          <a:p>
+            <a:r>
+              <a:rPr lang="en-US" sz="1400" b="1" i="1" dirty="0"/>
+              <a:t>Relevance to work: </a:t>
+            </a:r>
+            <a:r>
+              <a:rPr lang="en-US" sz="1400" dirty="0"/>
+              <a:t>The figure to the right is the first diagram I’ve found so far that actually breaks down the technical components of the algorithm. The article admits that YouTube’s algorithm is very “black box,” even to its own engineers, so we don’t have hard code or anything like that. But this is a good start.</a:t>
+            </a:r>
+          </a:p>
+          <a:p>
+            <a:r>
+              <a:rPr lang="en-US" sz="1400" b="1" i="1" dirty="0"/>
+              <a:t>Tags: </a:t>
+            </a:r>
+            <a:r>
+              <a:rPr lang="en-US" sz="1400" dirty="0"/>
+              <a:t>radicalization algorithms</a:t>
+            </a:r>
+          </a:p>
+        </p:txBody>
+      </p:sp>
+      <p:pic>
+        <p:nvPicPr>
+          <p:cNvPr id="7" name="Picture 6">
+            <a:extLst>
+              <a:ext uri="{FF2B5EF4-FFF2-40B4-BE49-F238E27FC236}">
+                <a16:creationId xmlns:a16="http://schemas.microsoft.com/office/drawing/2014/main" id="{D29B9C29-CFF3-9158-3A08-00A7285AAE3E}"/>
+              </a:ext>
+            </a:extLst>
+          </p:cNvPr>
+          <p:cNvPicPr>
+            <a:picLocks noChangeAspect="1"/>
+          </p:cNvPicPr>
+          <p:nvPr/>
+        </p:nvPicPr>
+        <p:blipFill>
+          <a:blip r:embed="rId2"/>
+          <a:stretch>
+            <a:fillRect/>
+          </a:stretch>
+        </p:blipFill>
+        <p:spPr>
+          <a:xfrm>
+            <a:off x="7014665" y="1942406"/>
+            <a:ext cx="4804439" cy="4092633"/>
+          </a:xfrm>
+          <a:prstGeom prst="rect">
+            <a:avLst/>
+          </a:prstGeom>
+        </p:spPr>
+      </p:pic>
+    </p:spTree>
+    <p:extLst>
+      <p:ext uri="{BB962C8B-B14F-4D97-AF65-F5344CB8AC3E}">
+        <p14:creationId xmlns:p14="http://schemas.microsoft.com/office/powerpoint/2010/main" val="2456482000"/>
+      </p:ext>
+    </p:extLst>
+  </p:cSld>
+  <p:clrMapOvr>
+    <a:masterClrMapping/>
+  </p:clrMapOvr>
+</p:sld>
+</file>
+
+<file path=ppt/slides/slide4.xml><?xml version="1.0" encoding="utf-8"?>
+<p:sld xmlns:a="http://schemas.openxmlformats.org/drawingml/2006/main" xmlns:r="http://schemas.openxmlformats.org/officeDocument/2006/relationships" xmlns:p="http://schemas.openxmlformats.org/presentationml/2006/main">
+  <p:cSld>
+    <p:spTree>
+      <p:nvGrpSpPr>
+        <p:cNvPr id="1" name=""/>
+        <p:cNvGrpSpPr/>
+        <p:nvPr/>
+      </p:nvGrpSpPr>
+      <p:grpSpPr>
+        <a:xfrm>
+          <a:off x="0" y="0"/>
+          <a:ext cx="0" cy="0"/>
+          <a:chOff x="0" y="0"/>
+          <a:chExt cx="0" cy="0"/>
+        </a:xfrm>
+      </p:grpSpPr>
+      <p:sp>
+        <p:nvSpPr>
+          <p:cNvPr id="2" name="Title 1">
+            <a:extLst>
+              <a:ext uri="{FF2B5EF4-FFF2-40B4-BE49-F238E27FC236}">
+                <a16:creationId xmlns:a16="http://schemas.microsoft.com/office/drawing/2014/main" id="{1836669E-7D47-3C8B-CBD9-BEC0259BB146}"/>
+              </a:ext>
+            </a:extLst>
+          </p:cNvPr>
+          <p:cNvSpPr>
+            <a:spLocks noGrp="1"/>
+          </p:cNvSpPr>
+          <p:nvPr>
+            <p:ph type="title"/>
+          </p:nvPr>
+        </p:nvSpPr>
+        <p:spPr>
+          <a:xfrm>
+            <a:off x="543098" y="642594"/>
+            <a:ext cx="10582102" cy="1371600"/>
+          </a:xfrm>
+        </p:spPr>
+        <p:txBody>
+          <a:bodyPr>
+            <a:normAutofit fontScale="90000"/>
+          </a:bodyPr>
+          <a:lstStyle/>
+          <a:p>
+            <a:r>
+              <a:rPr lang="en-US" dirty="0"/>
+              <a:t>Twitter's Algorithm: Amplifying Anger, Animosity, and Affective Polarization</a:t>
+            </a:r>
+          </a:p>
+        </p:txBody>
+      </p:sp>
+      <p:sp>
+        <p:nvSpPr>
+          <p:cNvPr id="3" name="Content Placeholder 2">
+            <a:extLst>
+              <a:ext uri="{FF2B5EF4-FFF2-40B4-BE49-F238E27FC236}">
+                <a16:creationId xmlns:a16="http://schemas.microsoft.com/office/drawing/2014/main" id="{1D48D484-6200-34E3-E5F0-1D76EB681F62}"/>
+              </a:ext>
+            </a:extLst>
+          </p:cNvPr>
+          <p:cNvSpPr>
+            <a:spLocks noGrp="1"/>
+          </p:cNvSpPr>
+          <p:nvPr>
+            <p:ph idx="1"/>
+          </p:nvPr>
+        </p:nvSpPr>
+        <p:spPr>
+          <a:xfrm>
+            <a:off x="543098" y="2014194"/>
+            <a:ext cx="10582102" cy="4153852"/>
+          </a:xfrm>
+        </p:spPr>
+        <p:txBody>
+          <a:bodyPr>
+            <a:normAutofit lnSpcReduction="10000"/>
+          </a:bodyPr>
+          <a:lstStyle/>
+          <a:p>
+            <a:pPr marL="0" indent="0">
+              <a:buNone/>
+            </a:pPr>
+            <a:r>
+              <a:rPr lang="en-US" sz="1200" dirty="0"/>
+              <a:t>Smitha Milli , Micah Carroll , Sashrika Pandey , Yike Wang , Anca D. Dragan</a:t>
+            </a:r>
+          </a:p>
+          <a:p>
+            <a:pPr marL="0" indent="0">
+              <a:buNone/>
+            </a:pPr>
+            <a:endParaRPr lang="en-US" sz="1200" b="1" i="1" dirty="0"/>
+          </a:p>
+          <a:p>
+            <a:r>
+              <a:rPr lang="en-US" sz="1800" b="1" i="1" dirty="0"/>
+              <a:t>Summary blurb:</a:t>
+            </a:r>
+            <a:r>
+              <a:rPr lang="en-US" sz="1800" dirty="0"/>
+              <a:t> This paper claims that th</a:t>
+            </a:r>
+            <a:r>
+              <a:rPr lang="en-US" dirty="0"/>
+              <a:t>e Twitter algorithm amplifies tweets that express strong emotions, particularly anger. In regards to political tweets, the Twitter algorithm actually presents tweets from out-groups (somewhat avoiding filter bubbles). However, the out-group tweets selected are those that express these strong emotions, and are therefore more divisive. This demonstrably contributes to negative perceptions of out-groups and more positive perception of the user’s in-groups.</a:t>
+            </a:r>
+            <a:endParaRPr lang="en-US" sz="1800" dirty="0"/>
+          </a:p>
+          <a:p>
+            <a:r>
+              <a:rPr lang="en-US" sz="1800" b="1" i="1" dirty="0"/>
+              <a:t>Relevance to work: </a:t>
+            </a:r>
+            <a:r>
+              <a:rPr lang="en-US" sz="1800" dirty="0"/>
+              <a:t>This paper </a:t>
+            </a:r>
+            <a:r>
+              <a:rPr lang="en-US" dirty="0"/>
+              <a:t>points out the challenges in similar papers on social media algorithms—we don’t have access to these algorithms, so we can only do research by “testing” the algorithm via observational methods. However, like the previous slide, I think that these sorts of observational methods are a good starting point when we don’t have any kind of code access.</a:t>
+            </a:r>
+            <a:endParaRPr lang="en-US" sz="1800" dirty="0"/>
+          </a:p>
+          <a:p>
+            <a:r>
+              <a:rPr lang="en-US" sz="1800" b="1" i="1" dirty="0"/>
+              <a:t>Tags: </a:t>
+            </a:r>
+            <a:r>
+              <a:rPr lang="en-US" sz="1800" dirty="0"/>
+              <a:t>radicalization algorithms</a:t>
+            </a:r>
+          </a:p>
+        </p:txBody>
+      </p:sp>
+    </p:spTree>
+    <p:extLst>
+      <p:ext uri="{BB962C8B-B14F-4D97-AF65-F5344CB8AC3E}">
+        <p14:creationId xmlns:p14="http://schemas.microsoft.com/office/powerpoint/2010/main" val="2178639373"/>
+      </p:ext>
+    </p:extLst>
+  </p:cSld>
+  <p:clrMapOvr>
+    <a:masterClrMapping/>
+  </p:clrMapOvr>
+</p:sld>
+</file>
+
+<file path=ppt/slides/slide5.xml><?xml version="1.0" encoding="utf-8"?>
+<p:sld xmlns:a="http://schemas.openxmlformats.org/drawingml/2006/main" xmlns:r="http://schemas.openxmlformats.org/officeDocument/2006/relationships" xmlns:p="http://schemas.openxmlformats.org/presentationml/2006/main">
+  <p:cSld>
+    <p:spTree>
+      <p:nvGrpSpPr>
+        <p:cNvPr id="1" name=""/>
+        <p:cNvGrpSpPr/>
+        <p:nvPr/>
+      </p:nvGrpSpPr>
+      <p:grpSpPr>
+        <a:xfrm>
+          <a:off x="0" y="0"/>
+          <a:ext cx="0" cy="0"/>
+          <a:chOff x="0" y="0"/>
+          <a:chExt cx="0" cy="0"/>
+        </a:xfrm>
+      </p:grpSpPr>
+      <p:sp>
+        <p:nvSpPr>
+          <p:cNvPr id="2" name="Title 1">
+            <a:extLst>
+              <a:ext uri="{FF2B5EF4-FFF2-40B4-BE49-F238E27FC236}">
+                <a16:creationId xmlns:a16="http://schemas.microsoft.com/office/drawing/2014/main" id="{1836669E-7D47-3C8B-CBD9-BEC0259BB146}"/>
+              </a:ext>
+            </a:extLst>
+          </p:cNvPr>
+          <p:cNvSpPr>
+            <a:spLocks noGrp="1"/>
+          </p:cNvSpPr>
+          <p:nvPr>
+            <p:ph type="title"/>
+          </p:nvPr>
+        </p:nvSpPr>
+        <p:spPr>
+          <a:xfrm>
+            <a:off x="543098" y="642594"/>
+            <a:ext cx="10582102" cy="1371600"/>
+          </a:xfrm>
+        </p:spPr>
+        <p:txBody>
+          <a:bodyPr>
+            <a:normAutofit fontScale="90000"/>
+          </a:bodyPr>
+          <a:lstStyle/>
+          <a:p>
+            <a:r>
+              <a:rPr lang="en-US" dirty="0"/>
+              <a:t>A New Approach? Deradicalization Programs and Counterterrorism</a:t>
+            </a:r>
+          </a:p>
+        </p:txBody>
+      </p:sp>
+      <p:sp>
+        <p:nvSpPr>
+          <p:cNvPr id="3" name="Content Placeholder 2">
+            <a:extLst>
+              <a:ext uri="{FF2B5EF4-FFF2-40B4-BE49-F238E27FC236}">
+                <a16:creationId xmlns:a16="http://schemas.microsoft.com/office/drawing/2014/main" id="{1D48D484-6200-34E3-E5F0-1D76EB681F62}"/>
+              </a:ext>
+            </a:extLst>
+          </p:cNvPr>
+          <p:cNvSpPr>
+            <a:spLocks noGrp="1"/>
+          </p:cNvSpPr>
+          <p:nvPr>
+            <p:ph idx="1"/>
+          </p:nvPr>
+        </p:nvSpPr>
+        <p:spPr>
+          <a:xfrm>
+            <a:off x="543098" y="2103120"/>
+            <a:ext cx="10582102" cy="4308764"/>
+          </a:xfrm>
+        </p:spPr>
+        <p:txBody>
+          <a:bodyPr>
+            <a:normAutofit/>
+          </a:bodyPr>
+          <a:lstStyle/>
+          <a:p>
+            <a:pPr marL="0" indent="0">
+              <a:buNone/>
+            </a:pPr>
+            <a:r>
+              <a:rPr lang="en-US" sz="1400" dirty="0"/>
+              <a:t>International Peace Institute</a:t>
+            </a:r>
+            <a:endParaRPr lang="en-US" sz="1400" b="1" i="1" dirty="0"/>
+          </a:p>
+          <a:p>
+            <a:r>
+              <a:rPr lang="en-US" sz="1800" b="1" i="1" dirty="0"/>
+              <a:t>Summary blurb:</a:t>
+            </a:r>
+            <a:r>
+              <a:rPr lang="en-US" sz="1800" dirty="0"/>
+              <a:t> This paper documents several case studies of different countries’ efforts to deradicalize Islamic terrorists. Many of th</a:t>
+            </a:r>
+            <a:r>
+              <a:rPr lang="en-US" dirty="0"/>
+              <a:t>e eight countries profiled offered resources to the families of those involved with (or imprisoned for) terrorist crimes; focus on family and social ties were believed to help prevent families and social networks from developing hatred and consequent violent radicalization. Some countries aimed to rehabilitate individuals involved in terrorism; methods of doing so included job training, education, and even marriage support. These varied approaches have been subject to much criticism, including “tough on crime” versus “soft on crime” debates, as well as concerns over “rewarding” terrorism by providing resources to involved individuals.</a:t>
+            </a:r>
+            <a:endParaRPr lang="en-US" sz="1800" dirty="0"/>
+          </a:p>
+          <a:p>
+            <a:r>
+              <a:rPr lang="en-US" sz="1800" b="1" i="1" dirty="0"/>
+              <a:t>Relevance to work: </a:t>
+            </a:r>
+            <a:r>
+              <a:rPr lang="en-US" sz="1800" dirty="0"/>
+              <a:t>I wanted to look a little into “deradicalization” techniques from the social sciences side because I wanted to see what there could possibly be mapped to a digital application.</a:t>
+            </a:r>
+          </a:p>
+          <a:p>
+            <a:r>
+              <a:rPr lang="en-US" sz="1800" b="1" i="1" dirty="0"/>
+              <a:t>Tags: </a:t>
+            </a:r>
+            <a:r>
+              <a:rPr lang="en-US" sz="1800" dirty="0"/>
+              <a:t>religious nationalism</a:t>
+            </a:r>
+          </a:p>
+          <a:p>
+            <a:endParaRPr lang="en-US" dirty="0"/>
+          </a:p>
+        </p:txBody>
+      </p:sp>
+    </p:spTree>
+    <p:extLst>
+      <p:ext uri="{BB962C8B-B14F-4D97-AF65-F5344CB8AC3E}">
+        <p14:creationId xmlns:p14="http://schemas.microsoft.com/office/powerpoint/2010/main" val="1035706860"/>
+      </p:ext>
+    </p:extLst>
+  </p:cSld>
+  <p:clrMapOvr>
+    <a:masterClrMapping/>
+  </p:clrMapOvr>
+</p:sld>
+</file>
+
+<file path=ppt/slides/slide6.xml><?xml version="1.0" encoding="utf-8"?>
+<p:sld xmlns:a="http://schemas.openxmlformats.org/drawingml/2006/main" xmlns:r="http://schemas.openxmlformats.org/officeDocument/2006/relationships" xmlns:p="http://schemas.openxmlformats.org/presentationml/2006/main">
+  <p:cSld>
+    <p:spTree>
+      <p:nvGrpSpPr>
+        <p:cNvPr id="1" name=""/>
+        <p:cNvGrpSpPr/>
+        <p:nvPr/>
+      </p:nvGrpSpPr>
+      <p:grpSpPr>
+        <a:xfrm>
+          <a:off x="0" y="0"/>
+          <a:ext cx="0" cy="0"/>
+          <a:chOff x="0" y="0"/>
+          <a:chExt cx="0" cy="0"/>
+        </a:xfrm>
+      </p:grpSpPr>
+      <p:sp>
+        <p:nvSpPr>
+          <p:cNvPr id="2" name="Title 1">
+            <a:extLst>
+              <a:ext uri="{FF2B5EF4-FFF2-40B4-BE49-F238E27FC236}">
+                <a16:creationId xmlns:a16="http://schemas.microsoft.com/office/drawing/2014/main" id="{1836669E-7D47-3C8B-CBD9-BEC0259BB146}"/>
+              </a:ext>
+            </a:extLst>
+          </p:cNvPr>
+          <p:cNvSpPr>
+            <a:spLocks noGrp="1"/>
+          </p:cNvSpPr>
+          <p:nvPr>
+            <p:ph type="title"/>
+          </p:nvPr>
+        </p:nvSpPr>
+        <p:spPr>
+          <a:xfrm>
+            <a:off x="543098" y="642594"/>
+            <a:ext cx="10582102" cy="1371600"/>
+          </a:xfrm>
+        </p:spPr>
+        <p:txBody>
+          <a:bodyPr>
+            <a:normAutofit/>
+          </a:bodyPr>
+          <a:lstStyle/>
+          <a:p>
+            <a:r>
+              <a:rPr lang="en-US" dirty="0"/>
+              <a:t>Title</a:t>
+            </a:r>
+          </a:p>
+        </p:txBody>
+      </p:sp>
+      <p:sp>
+        <p:nvSpPr>
+          <p:cNvPr id="3" name="Content Placeholder 2">
+            <a:extLst>
+              <a:ext uri="{FF2B5EF4-FFF2-40B4-BE49-F238E27FC236}">
+                <a16:creationId xmlns:a16="http://schemas.microsoft.com/office/drawing/2014/main" id="{1D48D484-6200-34E3-E5F0-1D76EB681F62}"/>
+              </a:ext>
+            </a:extLst>
+          </p:cNvPr>
+          <p:cNvSpPr>
+            <a:spLocks noGrp="1"/>
+          </p:cNvSpPr>
+          <p:nvPr>
+            <p:ph idx="1"/>
+          </p:nvPr>
+        </p:nvSpPr>
+        <p:spPr>
+          <a:xfrm>
+            <a:off x="543098" y="2103120"/>
+            <a:ext cx="10582102" cy="3931920"/>
+          </a:xfrm>
+        </p:spPr>
+        <p:txBody>
+          <a:bodyPr/>
+          <a:lstStyle/>
+          <a:p>
+            <a:r>
+              <a:rPr lang="en-US" dirty="0"/>
+              <a:t>Summary Blurb</a:t>
+            </a:r>
+          </a:p>
+          <a:p>
+            <a:r>
+              <a:rPr lang="en-US" dirty="0"/>
+              <a:t>Relevance to Work</a:t>
+            </a:r>
+          </a:p>
+          <a:p>
+            <a:r>
+              <a:rPr lang="en-US" dirty="0"/>
+              <a:t>Tags</a:t>
+            </a:r>
+          </a:p>
+        </p:txBody>
+      </p:sp>
+    </p:spTree>
+    <p:extLst>
+      <p:ext uri="{BB962C8B-B14F-4D97-AF65-F5344CB8AC3E}">
+        <p14:creationId xmlns:p14="http://schemas.microsoft.com/office/powerpoint/2010/main" val="3917602638"/>
+      </p:ext>
+    </p:extLst>
+  </p:cSld>
+  <p:clrMapOvr>
+    <a:masterClrMapping/>
+  </p:clrMapOvr>
+</p:sld>
+</file>
+
 <file path=ppt/theme/theme1.xml><?xml version="1.0" encoding="utf-8"?>
 <a:theme xmlns:a="http://schemas.openxmlformats.org/drawingml/2006/main" name="Savon">
   <a:themeElements>

</xml_diff>

<commit_message>
Update Sasha Research Sources.pptx
</commit_message>
<xml_diff>
--- a/Sasha Research Sources.pptx
+++ b/Sasha Research Sources.pptx
@@ -10,7 +10,9 @@
     <p:sldId id="257" r:id="rId4"/>
     <p:sldId id="259" r:id="rId5"/>
     <p:sldId id="260" r:id="rId6"/>
-    <p:sldId id="261" r:id="rId7"/>
+    <p:sldId id="262" r:id="rId7"/>
+    <p:sldId id="261" r:id="rId8"/>
+    <p:sldId id="263" r:id="rId9"/>
   </p:sldIdLst>
   <p:sldSz cx="12192000" cy="6858000"/>
   <p:notesSz cx="6858000" cy="9144000"/>
@@ -579,7 +581,7 @@
           <a:p>
             <a:fld id="{724FB8D8-D841-4D36-96BA-185A4D0CBB69}" type="datetimeFigureOut">
               <a:rPr lang="en-US" smtClean="0"/>
-              <a:t>6/12/2023</a:t>
+              <a:t>6/21/2023</a:t>
             </a:fld>
             <a:endParaRPr lang="en-US"/>
           </a:p>
@@ -781,7 +783,7 @@
           <a:p>
             <a:fld id="{724FB8D8-D841-4D36-96BA-185A4D0CBB69}" type="datetimeFigureOut">
               <a:rPr lang="en-US" smtClean="0"/>
-              <a:t>6/12/2023</a:t>
+              <a:t>6/21/2023</a:t>
             </a:fld>
             <a:endParaRPr lang="en-US"/>
           </a:p>
@@ -961,7 +963,7 @@
           <a:p>
             <a:fld id="{724FB8D8-D841-4D36-96BA-185A4D0CBB69}" type="datetimeFigureOut">
               <a:rPr lang="en-US" smtClean="0"/>
-              <a:t>6/12/2023</a:t>
+              <a:t>6/21/2023</a:t>
             </a:fld>
             <a:endParaRPr lang="en-US"/>
           </a:p>
@@ -1131,7 +1133,7 @@
           <a:p>
             <a:fld id="{724FB8D8-D841-4D36-96BA-185A4D0CBB69}" type="datetimeFigureOut">
               <a:rPr lang="en-US" smtClean="0"/>
-              <a:t>6/12/2023</a:t>
+              <a:t>6/21/2023</a:t>
             </a:fld>
             <a:endParaRPr lang="en-US"/>
           </a:p>
@@ -1702,7 +1704,7 @@
           <a:p>
             <a:fld id="{724FB8D8-D841-4D36-96BA-185A4D0CBB69}" type="datetimeFigureOut">
               <a:rPr lang="en-US" smtClean="0"/>
-              <a:t>6/12/2023</a:t>
+              <a:t>6/21/2023</a:t>
             </a:fld>
             <a:endParaRPr lang="en-US"/>
           </a:p>
@@ -2004,7 +2006,7 @@
           <a:p>
             <a:fld id="{724FB8D8-D841-4D36-96BA-185A4D0CBB69}" type="datetimeFigureOut">
               <a:rPr lang="en-US" smtClean="0"/>
-              <a:t>6/12/2023</a:t>
+              <a:t>6/21/2023</a:t>
             </a:fld>
             <a:endParaRPr lang="en-US"/>
           </a:p>
@@ -2441,7 +2443,7 @@
           <a:p>
             <a:fld id="{724FB8D8-D841-4D36-96BA-185A4D0CBB69}" type="datetimeFigureOut">
               <a:rPr lang="en-US" smtClean="0"/>
-              <a:t>6/12/2023</a:t>
+              <a:t>6/21/2023</a:t>
             </a:fld>
             <a:endParaRPr lang="en-US"/>
           </a:p>
@@ -2559,7 +2561,7 @@
           <a:p>
             <a:fld id="{724FB8D8-D841-4D36-96BA-185A4D0CBB69}" type="datetimeFigureOut">
               <a:rPr lang="en-US" smtClean="0"/>
-              <a:t>6/12/2023</a:t>
+              <a:t>6/21/2023</a:t>
             </a:fld>
             <a:endParaRPr lang="en-US"/>
           </a:p>
@@ -2654,7 +2656,7 @@
           <a:p>
             <a:fld id="{724FB8D8-D841-4D36-96BA-185A4D0CBB69}" type="datetimeFigureOut">
               <a:rPr lang="en-US" smtClean="0"/>
-              <a:t>6/12/2023</a:t>
+              <a:t>6/21/2023</a:t>
             </a:fld>
             <a:endParaRPr lang="en-US"/>
           </a:p>
@@ -3036,7 +3038,7 @@
           <a:p>
             <a:fld id="{724FB8D8-D841-4D36-96BA-185A4D0CBB69}" type="datetimeFigureOut">
               <a:rPr lang="en-US" smtClean="0"/>
-              <a:t>6/12/2023</a:t>
+              <a:t>6/21/2023</a:t>
             </a:fld>
             <a:endParaRPr lang="en-US"/>
           </a:p>
@@ -3430,7 +3432,7 @@
           <a:p>
             <a:fld id="{724FB8D8-D841-4D36-96BA-185A4D0CBB69}" type="datetimeFigureOut">
               <a:rPr lang="en-US" smtClean="0"/>
-              <a:t>6/12/2023</a:t>
+              <a:t>6/21/2023</a:t>
             </a:fld>
             <a:endParaRPr lang="en-US"/>
           </a:p>
@@ -3727,7 +3729,7 @@
           <a:p>
             <a:fld id="{724FB8D8-D841-4D36-96BA-185A4D0CBB69}" type="datetimeFigureOut">
               <a:rPr lang="en-US" smtClean="0"/>
-              <a:t>6/12/2023</a:t>
+              <a:t>6/21/2023</a:t>
             </a:fld>
             <a:endParaRPr lang="en-US"/>
           </a:p>
@@ -4804,6 +4806,93 @@
           <p:cNvPr id="2" name="Title 1">
             <a:extLst>
               <a:ext uri="{FF2B5EF4-FFF2-40B4-BE49-F238E27FC236}">
+                <a16:creationId xmlns:a16="http://schemas.microsoft.com/office/drawing/2014/main" id="{3A6806F0-75CB-780B-0344-F24A8EA59EDC}"/>
+              </a:ext>
+            </a:extLst>
+          </p:cNvPr>
+          <p:cNvSpPr>
+            <a:spLocks noGrp="1"/>
+          </p:cNvSpPr>
+          <p:nvPr>
+            <p:ph type="title"/>
+          </p:nvPr>
+        </p:nvSpPr>
+        <p:spPr/>
+        <p:txBody>
+          <a:bodyPr/>
+          <a:lstStyle/>
+          <a:p>
+            <a:r>
+              <a:rPr lang="en-US" dirty="0" err="1"/>
+              <a:t>Weekof</a:t>
+            </a:r>
+            <a:r>
+              <a:rPr lang="en-US" dirty="0"/>
+              <a:t> 6/19/23</a:t>
+            </a:r>
+          </a:p>
+        </p:txBody>
+      </p:sp>
+      <p:sp>
+        <p:nvSpPr>
+          <p:cNvPr id="3" name="Text Placeholder 2">
+            <a:extLst>
+              <a:ext uri="{FF2B5EF4-FFF2-40B4-BE49-F238E27FC236}">
+                <a16:creationId xmlns:a16="http://schemas.microsoft.com/office/drawing/2014/main" id="{F99E997B-9BAF-FC94-C424-7526F202447D}"/>
+              </a:ext>
+            </a:extLst>
+          </p:cNvPr>
+          <p:cNvSpPr>
+            <a:spLocks noGrp="1"/>
+          </p:cNvSpPr>
+          <p:nvPr>
+            <p:ph type="body" idx="1"/>
+          </p:nvPr>
+        </p:nvSpPr>
+        <p:spPr/>
+        <p:txBody>
+          <a:bodyPr/>
+          <a:lstStyle/>
+          <a:p>
+            <a:endParaRPr lang="en-US"/>
+          </a:p>
+        </p:txBody>
+      </p:sp>
+    </p:spTree>
+    <p:extLst>
+      <p:ext uri="{BB962C8B-B14F-4D97-AF65-F5344CB8AC3E}">
+        <p14:creationId xmlns:p14="http://schemas.microsoft.com/office/powerpoint/2010/main" val="923566339"/>
+      </p:ext>
+    </p:extLst>
+  </p:cSld>
+  <p:clrMapOvr>
+    <a:masterClrMapping/>
+  </p:clrMapOvr>
+</p:sld>
+</file>
+
+<file path=ppt/slides/slide7.xml><?xml version="1.0" encoding="utf-8"?>
+<p:sld xmlns:a="http://schemas.openxmlformats.org/drawingml/2006/main" xmlns:r="http://schemas.openxmlformats.org/officeDocument/2006/relationships" xmlns:p="http://schemas.openxmlformats.org/presentationml/2006/main">
+  <p:cSld>
+    <p:spTree>
+      <p:nvGrpSpPr>
+        <p:cNvPr id="1" name=""/>
+        <p:cNvGrpSpPr/>
+        <p:nvPr/>
+      </p:nvGrpSpPr>
+      <p:grpSpPr>
+        <a:xfrm>
+          <a:off x="0" y="0"/>
+          <a:ext cx="0" cy="0"/>
+          <a:chOff x="0" y="0"/>
+          <a:chExt cx="0" cy="0"/>
+        </a:xfrm>
+      </p:grpSpPr>
+      <p:sp>
+        <p:nvSpPr>
+          <p:cNvPr id="2" name="Title 1">
+            <a:extLst>
+              <a:ext uri="{FF2B5EF4-FFF2-40B4-BE49-F238E27FC236}">
                 <a16:creationId xmlns:a16="http://schemas.microsoft.com/office/drawing/2014/main" id="{1836669E-7D47-3C8B-CBD9-BEC0259BB146}"/>
               </a:ext>
             </a:extLst>
@@ -4828,9 +4917,10 @@
           <a:lstStyle/>
           <a:p>
             <a:r>
-              <a:rPr lang="en-US" dirty="0"/>
-              <a:t>Title</a:t>
-            </a:r>
+              <a:rPr lang="en-US"/>
+              <a:t>The Hidden Tribes of America</a:t>
+            </a:r>
+            <a:endParaRPr lang="en-US" dirty="0"/>
           </a:p>
         </p:txBody>
       </p:sp>
@@ -4853,36 +4943,214 @@
         <p:spPr>
           <a:xfrm>
             <a:off x="543098" y="2103120"/>
-            <a:ext cx="10582102" cy="3931920"/>
-          </a:xfrm>
-        </p:spPr>
-        <p:txBody>
-          <a:bodyPr/>
+            <a:ext cx="6550429" cy="3931920"/>
+          </a:xfrm>
+        </p:spPr>
+        <p:txBody>
+          <a:bodyPr>
+            <a:normAutofit lnSpcReduction="10000"/>
+          </a:bodyPr>
           <a:lstStyle/>
           <a:p>
             <a:r>
+              <a:rPr lang="en-US" b="1" i="1" dirty="0"/>
+              <a:t>Summary Blurb: </a:t>
+            </a:r>
+            <a:r>
               <a:rPr lang="en-US" dirty="0"/>
-              <a:t>Summary Blurb</a:t>
-            </a:r>
-          </a:p>
-          <a:p>
+              <a:t>This 195-page report outlines a study performed on over 8,000 Americans (demographics reflective of the U.S. Census). The aim of this study was to understand political polarization in the U.S., as well as identify the main ideological groups that Americans fall into. Results found seven different groups with varying degrees of political engagement, and a wide variety of views on divisive topics (as well as differences in willingness to engage differing opinions).</a:t>
+            </a:r>
+          </a:p>
+          <a:p>
+            <a:r>
+              <a:rPr lang="en-US" b="1" i="1" dirty="0"/>
+              <a:t>Relevance to Work:</a:t>
+            </a:r>
             <a:r>
               <a:rPr lang="en-US" dirty="0"/>
-              <a:t>Relevance to Work</a:t>
-            </a:r>
-          </a:p>
-          <a:p>
+              <a:t> This study provides a lot of good information as to how different kinds of political Americans operate (which is handy for the YouTube simulation).</a:t>
+            </a:r>
+          </a:p>
+          <a:p>
+            <a:r>
+              <a:rPr lang="en-US" b="1" i="1" dirty="0"/>
+              <a:t>Tags:</a:t>
+            </a:r>
             <a:r>
               <a:rPr lang="en-US" dirty="0"/>
-              <a:t>Tags</a:t>
-            </a:r>
-          </a:p>
-        </p:txBody>
-      </p:sp>
+              <a:t> religious nationalism</a:t>
+            </a:r>
+          </a:p>
+        </p:txBody>
+      </p:sp>
+      <p:pic>
+        <p:nvPicPr>
+          <p:cNvPr id="1025" name="Picture 1" descr="Progressive Activists &#10;Traditional Liberals &#10;Passive Liberals &#10;Politically Disengaged &#10;Moderates &#10;Traditional Conservatives &#10;Devoted Conservatives ">
+            <a:extLst>
+              <a:ext uri="{FF2B5EF4-FFF2-40B4-BE49-F238E27FC236}">
+                <a16:creationId xmlns:a16="http://schemas.microsoft.com/office/drawing/2014/main" id="{03E3A490-2E92-A8D5-84B8-73F102F9A7F8}"/>
+              </a:ext>
+            </a:extLst>
+          </p:cNvPr>
+          <p:cNvPicPr>
+            <a:picLocks noChangeAspect="1" noChangeArrowheads="1"/>
+          </p:cNvPicPr>
+          <p:nvPr/>
+        </p:nvPicPr>
+        <p:blipFill>
+          <a:blip r:embed="rId2">
+            <a:extLst>
+              <a:ext uri="{28A0092B-C50C-407E-A947-70E740481C1C}">
+                <a14:useLocalDpi xmlns:a14="http://schemas.microsoft.com/office/drawing/2010/main" val="0"/>
+              </a:ext>
+            </a:extLst>
+          </a:blip>
+          <a:srcRect/>
+          <a:stretch>
+            <a:fillRect/>
+          </a:stretch>
+        </p:blipFill>
+        <p:spPr bwMode="auto">
+          <a:xfrm>
+            <a:off x="7277955" y="1886860"/>
+            <a:ext cx="4192397" cy="4364439"/>
+          </a:xfrm>
+          <a:prstGeom prst="rect">
+            <a:avLst/>
+          </a:prstGeom>
+          <a:noFill/>
+          <a:effectLst>
+            <a:outerShdw blurRad="50800" dist="38100" dir="2700000" algn="tl" rotWithShape="0">
+              <a:prstClr val="black">
+                <a:alpha val="40000"/>
+              </a:prstClr>
+            </a:outerShdw>
+          </a:effectLst>
+          <a:extLst>
+            <a:ext uri="{909E8E84-426E-40DD-AFC4-6F175D3DCCD1}">
+              <a14:hiddenFill xmlns:a14="http://schemas.microsoft.com/office/drawing/2010/main">
+                <a:solidFill>
+                  <a:srgbClr val="FFFFFF"/>
+                </a:solidFill>
+              </a14:hiddenFill>
+            </a:ext>
+          </a:extLst>
+        </p:spPr>
+      </p:pic>
     </p:spTree>
     <p:extLst>
       <p:ext uri="{BB962C8B-B14F-4D97-AF65-F5344CB8AC3E}">
         <p14:creationId xmlns:p14="http://schemas.microsoft.com/office/powerpoint/2010/main" val="3917602638"/>
+      </p:ext>
+    </p:extLst>
+  </p:cSld>
+  <p:clrMapOvr>
+    <a:masterClrMapping/>
+  </p:clrMapOvr>
+</p:sld>
+</file>
+
+<file path=ppt/slides/slide8.xml><?xml version="1.0" encoding="utf-8"?>
+<p:sld xmlns:a="http://schemas.openxmlformats.org/drawingml/2006/main" xmlns:r="http://schemas.openxmlformats.org/officeDocument/2006/relationships" xmlns:p="http://schemas.openxmlformats.org/presentationml/2006/main">
+  <p:cSld>
+    <p:spTree>
+      <p:nvGrpSpPr>
+        <p:cNvPr id="1" name=""/>
+        <p:cNvGrpSpPr/>
+        <p:nvPr/>
+      </p:nvGrpSpPr>
+      <p:grpSpPr>
+        <a:xfrm>
+          <a:off x="0" y="0"/>
+          <a:ext cx="0" cy="0"/>
+          <a:chOff x="0" y="0"/>
+          <a:chExt cx="0" cy="0"/>
+        </a:xfrm>
+      </p:grpSpPr>
+      <p:sp>
+        <p:nvSpPr>
+          <p:cNvPr id="2" name="Title 1">
+            <a:extLst>
+              <a:ext uri="{FF2B5EF4-FFF2-40B4-BE49-F238E27FC236}">
+                <a16:creationId xmlns:a16="http://schemas.microsoft.com/office/drawing/2014/main" id="{1836669E-7D47-3C8B-CBD9-BEC0259BB146}"/>
+              </a:ext>
+            </a:extLst>
+          </p:cNvPr>
+          <p:cNvSpPr>
+            <a:spLocks noGrp="1"/>
+          </p:cNvSpPr>
+          <p:nvPr>
+            <p:ph type="title"/>
+          </p:nvPr>
+        </p:nvSpPr>
+        <p:spPr>
+          <a:xfrm>
+            <a:off x="543098" y="642594"/>
+            <a:ext cx="10582102" cy="1371600"/>
+          </a:xfrm>
+        </p:spPr>
+        <p:txBody>
+          <a:bodyPr>
+            <a:normAutofit/>
+          </a:bodyPr>
+          <a:lstStyle/>
+          <a:p>
+            <a:r>
+              <a:rPr lang="en-US" dirty="0"/>
+              <a:t>Title</a:t>
+            </a:r>
+          </a:p>
+        </p:txBody>
+      </p:sp>
+      <p:sp>
+        <p:nvSpPr>
+          <p:cNvPr id="3" name="Content Placeholder 2">
+            <a:extLst>
+              <a:ext uri="{FF2B5EF4-FFF2-40B4-BE49-F238E27FC236}">
+                <a16:creationId xmlns:a16="http://schemas.microsoft.com/office/drawing/2014/main" id="{1D48D484-6200-34E3-E5F0-1D76EB681F62}"/>
+              </a:ext>
+            </a:extLst>
+          </p:cNvPr>
+          <p:cNvSpPr>
+            <a:spLocks noGrp="1"/>
+          </p:cNvSpPr>
+          <p:nvPr>
+            <p:ph idx="1"/>
+          </p:nvPr>
+        </p:nvSpPr>
+        <p:spPr>
+          <a:xfrm>
+            <a:off x="543098" y="2103120"/>
+            <a:ext cx="10582102" cy="3931920"/>
+          </a:xfrm>
+        </p:spPr>
+        <p:txBody>
+          <a:bodyPr/>
+          <a:lstStyle/>
+          <a:p>
+            <a:r>
+              <a:rPr lang="en-US" dirty="0"/>
+              <a:t>Summary Blurb</a:t>
+            </a:r>
+          </a:p>
+          <a:p>
+            <a:r>
+              <a:rPr lang="en-US" dirty="0"/>
+              <a:t>Relevance to Work</a:t>
+            </a:r>
+          </a:p>
+          <a:p>
+            <a:r>
+              <a:rPr lang="en-US" dirty="0"/>
+              <a:t>Tags</a:t>
+            </a:r>
+          </a:p>
+        </p:txBody>
+      </p:sp>
+    </p:spTree>
+    <p:extLst>
+      <p:ext uri="{BB962C8B-B14F-4D97-AF65-F5344CB8AC3E}">
+        <p14:creationId xmlns:p14="http://schemas.microsoft.com/office/powerpoint/2010/main" val="2013476514"/>
       </p:ext>
     </p:extLst>
   </p:cSld>

</xml_diff>